<commit_message>
Update EE464 Hardware Project Presentation.pptx
</commit_message>
<xml_diff>
--- a/presentation/EE464 Hardware Project Presentation.pptx
+++ b/presentation/EE464 Hardware Project Presentation.pptx
@@ -13,9 +13,11 @@
     <p:sldId id="264" r:id="rId7"/>
     <p:sldId id="265" r:id="rId8"/>
     <p:sldId id="266" r:id="rId9"/>
-    <p:sldId id="267" r:id="rId10"/>
-    <p:sldId id="262" r:id="rId11"/>
-    <p:sldId id="261" r:id="rId12"/>
+    <p:sldId id="262" r:id="rId10"/>
+    <p:sldId id="267" r:id="rId11"/>
+    <p:sldId id="269" r:id="rId12"/>
+    <p:sldId id="268" r:id="rId13"/>
+    <p:sldId id="261" r:id="rId14"/>
   </p:sldIdLst>
   <p:sldSz cx="12192000" cy="6858000"/>
   <p:notesSz cx="6858000" cy="9144000"/>
@@ -114,6 +116,11 @@
       </a:defRPr>
     </a:lvl9pPr>
   </p:defaultTextStyle>
+  <p:extLst>
+    <p:ext uri="{EFAFB233-063F-42B5-8137-9DF3F51BA10A}">
+      <p15:sldGuideLst xmlns:p15="http://schemas.microsoft.com/office/powerpoint/2012/main"/>
+    </p:ext>
+  </p:extLst>
 </p:presentation>
 </file>
 
@@ -264,7 +271,7 @@
           <a:p>
             <a:fld id="{B278A3DA-4311-4F40-BCBC-F4FC10C14022}" type="datetimeFigureOut">
               <a:rPr lang="en-US" smtClean="0"/>
-              <a:t>5/9/2023</a:t>
+              <a:t>5/10/2023</a:t>
             </a:fld>
             <a:endParaRPr lang="en-US"/>
           </a:p>
@@ -462,7 +469,7 @@
           <a:p>
             <a:fld id="{B278A3DA-4311-4F40-BCBC-F4FC10C14022}" type="datetimeFigureOut">
               <a:rPr lang="en-US" smtClean="0"/>
-              <a:t>5/9/2023</a:t>
+              <a:t>5/10/2023</a:t>
             </a:fld>
             <a:endParaRPr lang="en-US"/>
           </a:p>
@@ -670,7 +677,7 @@
           <a:p>
             <a:fld id="{B278A3DA-4311-4F40-BCBC-F4FC10C14022}" type="datetimeFigureOut">
               <a:rPr lang="en-US" smtClean="0"/>
-              <a:t>5/9/2023</a:t>
+              <a:t>5/10/2023</a:t>
             </a:fld>
             <a:endParaRPr lang="en-US"/>
           </a:p>
@@ -868,7 +875,7 @@
           <a:p>
             <a:fld id="{B278A3DA-4311-4F40-BCBC-F4FC10C14022}" type="datetimeFigureOut">
               <a:rPr lang="en-US" smtClean="0"/>
-              <a:t>5/9/2023</a:t>
+              <a:t>5/10/2023</a:t>
             </a:fld>
             <a:endParaRPr lang="en-US"/>
           </a:p>
@@ -1143,7 +1150,7 @@
           <a:p>
             <a:fld id="{B278A3DA-4311-4F40-BCBC-F4FC10C14022}" type="datetimeFigureOut">
               <a:rPr lang="en-US" smtClean="0"/>
-              <a:t>5/9/2023</a:t>
+              <a:t>5/10/2023</a:t>
             </a:fld>
             <a:endParaRPr lang="en-US"/>
           </a:p>
@@ -1408,7 +1415,7 @@
           <a:p>
             <a:fld id="{B278A3DA-4311-4F40-BCBC-F4FC10C14022}" type="datetimeFigureOut">
               <a:rPr lang="en-US" smtClean="0"/>
-              <a:t>5/9/2023</a:t>
+              <a:t>5/10/2023</a:t>
             </a:fld>
             <a:endParaRPr lang="en-US"/>
           </a:p>
@@ -1820,7 +1827,7 @@
           <a:p>
             <a:fld id="{B278A3DA-4311-4F40-BCBC-F4FC10C14022}" type="datetimeFigureOut">
               <a:rPr lang="en-US" smtClean="0"/>
-              <a:t>5/9/2023</a:t>
+              <a:t>5/10/2023</a:t>
             </a:fld>
             <a:endParaRPr lang="en-US"/>
           </a:p>
@@ -1961,7 +1968,7 @@
           <a:p>
             <a:fld id="{B278A3DA-4311-4F40-BCBC-F4FC10C14022}" type="datetimeFigureOut">
               <a:rPr lang="en-US" smtClean="0"/>
-              <a:t>5/9/2023</a:t>
+              <a:t>5/10/2023</a:t>
             </a:fld>
             <a:endParaRPr lang="en-US"/>
           </a:p>
@@ -2074,7 +2081,7 @@
           <a:p>
             <a:fld id="{B278A3DA-4311-4F40-BCBC-F4FC10C14022}" type="datetimeFigureOut">
               <a:rPr lang="en-US" smtClean="0"/>
-              <a:t>5/9/2023</a:t>
+              <a:t>5/10/2023</a:t>
             </a:fld>
             <a:endParaRPr lang="en-US"/>
           </a:p>
@@ -2385,7 +2392,7 @@
           <a:p>
             <a:fld id="{B278A3DA-4311-4F40-BCBC-F4FC10C14022}" type="datetimeFigureOut">
               <a:rPr lang="en-US" smtClean="0"/>
-              <a:t>5/9/2023</a:t>
+              <a:t>5/10/2023</a:t>
             </a:fld>
             <a:endParaRPr lang="en-US"/>
           </a:p>
@@ -2673,7 +2680,7 @@
           <a:p>
             <a:fld id="{B278A3DA-4311-4F40-BCBC-F4FC10C14022}" type="datetimeFigureOut">
               <a:rPr lang="en-US" smtClean="0"/>
-              <a:t>5/9/2023</a:t>
+              <a:t>5/10/2023</a:t>
             </a:fld>
             <a:endParaRPr lang="en-US"/>
           </a:p>
@@ -2914,7 +2921,7 @@
           <a:p>
             <a:fld id="{B278A3DA-4311-4F40-BCBC-F4FC10C14022}" type="datetimeFigureOut">
               <a:rPr lang="en-US" smtClean="0"/>
-              <a:t>5/9/2023</a:t>
+              <a:t>5/10/2023</a:t>
             </a:fld>
             <a:endParaRPr lang="en-US"/>
           </a:p>
@@ -3471,7 +3478,7 @@
           <p:cNvPr id="2" name="Title 1">
             <a:extLst>
               <a:ext uri="{FF2B5EF4-FFF2-40B4-BE49-F238E27FC236}">
-                <a16:creationId xmlns:a16="http://schemas.microsoft.com/office/drawing/2014/main" id="{DD52401F-2C7B-4276-AB25-B19D8D439BA7}"/>
+                <a16:creationId xmlns:a16="http://schemas.microsoft.com/office/drawing/2014/main" id="{C670D02B-CE3A-4A0B-A13F-D9569E334D4E}"/>
               </a:ext>
             </a:extLst>
           </p:cNvPr>
@@ -3489,318 +3496,93 @@
           <a:p>
             <a:r>
               <a:rPr lang="en-US" dirty="0"/>
-              <a:t>Efficiency Calculations</a:t>
-            </a:r>
-          </a:p>
-        </p:txBody>
-      </p:sp>
-      <p:graphicFrame>
-        <p:nvGraphicFramePr>
-          <p:cNvPr id="6" name="Table 6">
-            <a:extLst>
-              <a:ext uri="{FF2B5EF4-FFF2-40B4-BE49-F238E27FC236}">
-                <a16:creationId xmlns:a16="http://schemas.microsoft.com/office/drawing/2014/main" id="{A6381643-80EA-4B0F-8C4E-CFF329046A5B}"/>
-              </a:ext>
-            </a:extLst>
-          </p:cNvPr>
-          <p:cNvGraphicFramePr>
-            <a:graphicFrameLocks noGrp="1"/>
-          </p:cNvGraphicFramePr>
+              <a:t>Controller: UC3843</a:t>
+            </a:r>
+          </a:p>
+        </p:txBody>
+      </p:sp>
+      <p:sp>
+        <p:nvSpPr>
+          <p:cNvPr id="3" name="Content Placeholder 2">
+            <a:extLst>
+              <a:ext uri="{FF2B5EF4-FFF2-40B4-BE49-F238E27FC236}">
+                <a16:creationId xmlns:a16="http://schemas.microsoft.com/office/drawing/2014/main" id="{2C58BCCF-C7C5-4BEB-9A03-4D0529186014}"/>
+              </a:ext>
+            </a:extLst>
+          </p:cNvPr>
+          <p:cNvSpPr>
+            <a:spLocks noGrp="1"/>
+          </p:cNvSpPr>
           <p:nvPr>
             <p:ph idx="1"/>
-            <p:extLst>
-              <p:ext uri="{D42A27DB-BD31-4B8C-83A1-F6EECF244321}">
-                <p14:modId xmlns:p14="http://schemas.microsoft.com/office/powerpoint/2010/main" val="2198122635"/>
-              </p:ext>
-            </p:extLst>
-          </p:nvPr>
-        </p:nvGraphicFramePr>
-        <p:xfrm>
-          <a:off x="838200" y="1825625"/>
-          <a:ext cx="10515600" cy="4667250"/>
-        </p:xfrm>
-        <a:graphic>
-          <a:graphicData uri="http://schemas.openxmlformats.org/drawingml/2006/table">
-            <a:tbl>
-              <a:tblPr firstRow="1" bandRow="1">
-                <a:tableStyleId>{5C22544A-7EE6-4342-B048-85BDC9FD1C3A}</a:tableStyleId>
-              </a:tblPr>
-              <a:tblGrid>
-                <a:gridCol w="3505200">
-                  <a:extLst>
-                    <a:ext uri="{9D8B030D-6E8A-4147-A177-3AD203B41FA5}">
-                      <a16:colId xmlns:a16="http://schemas.microsoft.com/office/drawing/2014/main" val="2456820567"/>
-                    </a:ext>
-                  </a:extLst>
-                </a:gridCol>
-                <a:gridCol w="3505200">
-                  <a:extLst>
-                    <a:ext uri="{9D8B030D-6E8A-4147-A177-3AD203B41FA5}">
-                      <a16:colId xmlns:a16="http://schemas.microsoft.com/office/drawing/2014/main" val="1682064277"/>
-                    </a:ext>
-                  </a:extLst>
-                </a:gridCol>
-                <a:gridCol w="3505200">
-                  <a:extLst>
-                    <a:ext uri="{9D8B030D-6E8A-4147-A177-3AD203B41FA5}">
-                      <a16:colId xmlns:a16="http://schemas.microsoft.com/office/drawing/2014/main" val="114378116"/>
-                    </a:ext>
-                  </a:extLst>
-                </a:gridCol>
-              </a:tblGrid>
-              <a:tr h="933450">
-                <a:tc>
-                  <a:txBody>
-                    <a:bodyPr/>
-                    <a:lstStyle/>
-                    <a:p>
-                      <a:pPr algn="ctr"/>
-                      <a:r>
-                        <a:rPr lang="en-US" sz="3200" dirty="0"/>
-                        <a:t>Load (%)</a:t>
-                      </a:r>
-                    </a:p>
-                  </a:txBody>
-                  <a:tcPr/>
-                </a:tc>
-                <a:tc>
-                  <a:txBody>
-                    <a:bodyPr/>
-                    <a:lstStyle/>
-                    <a:p>
-                      <a:pPr algn="ctr"/>
-                      <a:r>
-                        <a:rPr lang="en-US" sz="3200" dirty="0"/>
-                        <a:t>Vin = 12V</a:t>
-                      </a:r>
-                    </a:p>
-                  </a:txBody>
-                  <a:tcPr/>
-                </a:tc>
-                <a:tc>
-                  <a:txBody>
-                    <a:bodyPr/>
-                    <a:lstStyle/>
-                    <a:p>
-                      <a:pPr algn="ctr"/>
-                      <a:r>
-                        <a:rPr lang="en-US" sz="3200" dirty="0"/>
-                        <a:t>Vin = 18V</a:t>
-                      </a:r>
-                    </a:p>
-                  </a:txBody>
-                  <a:tcPr/>
-                </a:tc>
-                <a:extLst>
-                  <a:ext uri="{0D108BD9-81ED-4DB2-BD59-A6C34878D82A}">
-                    <a16:rowId xmlns:a16="http://schemas.microsoft.com/office/drawing/2014/main" val="1792460050"/>
-                  </a:ext>
-                </a:extLst>
-              </a:tr>
-              <a:tr h="933450">
-                <a:tc>
-                  <a:txBody>
-                    <a:bodyPr/>
-                    <a:lstStyle/>
-                    <a:p>
-                      <a:pPr algn="ctr"/>
-                      <a:r>
-                        <a:rPr lang="en-US" sz="3200" dirty="0"/>
-                        <a:t>25</a:t>
-                      </a:r>
-                    </a:p>
-                  </a:txBody>
-                  <a:tcPr/>
-                </a:tc>
-                <a:tc>
-                  <a:txBody>
-                    <a:bodyPr/>
-                    <a:lstStyle/>
-                    <a:p>
-                      <a:pPr algn="ctr"/>
-                      <a:r>
-                        <a:rPr lang="en-US" sz="3200" dirty="0"/>
-                        <a:t>72.2</a:t>
-                      </a:r>
-                    </a:p>
-                  </a:txBody>
-                  <a:tcPr/>
-                </a:tc>
-                <a:tc>
-                  <a:txBody>
-                    <a:bodyPr/>
-                    <a:lstStyle/>
-                    <a:p>
-                      <a:pPr algn="ctr"/>
-                      <a:r>
-                        <a:rPr lang="en-US" sz="3200" dirty="0"/>
-                        <a:t>65.9</a:t>
-                      </a:r>
-                    </a:p>
-                  </a:txBody>
-                  <a:tcPr/>
-                </a:tc>
-                <a:extLst>
-                  <a:ext uri="{0D108BD9-81ED-4DB2-BD59-A6C34878D82A}">
-                    <a16:rowId xmlns:a16="http://schemas.microsoft.com/office/drawing/2014/main" val="2253898298"/>
-                  </a:ext>
-                </a:extLst>
-              </a:tr>
-              <a:tr h="933450">
-                <a:tc>
-                  <a:txBody>
-                    <a:bodyPr/>
-                    <a:lstStyle/>
-                    <a:p>
-                      <a:pPr algn="ctr"/>
-                      <a:r>
-                        <a:rPr lang="en-US" sz="3200" dirty="0"/>
-                        <a:t>50</a:t>
-                      </a:r>
-                    </a:p>
-                  </a:txBody>
-                  <a:tcPr/>
-                </a:tc>
-                <a:tc>
-                  <a:txBody>
-                    <a:bodyPr/>
-                    <a:lstStyle/>
-                    <a:p>
-                      <a:pPr algn="ctr"/>
-                      <a:r>
-                        <a:rPr lang="en-US" sz="3200" dirty="0"/>
-                        <a:t>77</a:t>
-                      </a:r>
-                    </a:p>
-                  </a:txBody>
-                  <a:tcPr/>
-                </a:tc>
-                <a:tc>
-                  <a:txBody>
-                    <a:bodyPr/>
-                    <a:lstStyle/>
-                    <a:p>
-                      <a:pPr algn="ctr"/>
-                      <a:r>
-                        <a:rPr lang="en-US" sz="3200" dirty="0"/>
-                        <a:t>76</a:t>
-                      </a:r>
-                    </a:p>
-                  </a:txBody>
-                  <a:tcPr/>
-                </a:tc>
-                <a:extLst>
-                  <a:ext uri="{0D108BD9-81ED-4DB2-BD59-A6C34878D82A}">
-                    <a16:rowId xmlns:a16="http://schemas.microsoft.com/office/drawing/2014/main" val="3708298407"/>
-                  </a:ext>
-                </a:extLst>
-              </a:tr>
-              <a:tr h="933450">
-                <a:tc>
-                  <a:txBody>
-                    <a:bodyPr/>
-                    <a:lstStyle/>
-                    <a:p>
-                      <a:pPr algn="ctr"/>
-                      <a:r>
-                        <a:rPr lang="en-US" sz="3200" dirty="0"/>
-                        <a:t>75</a:t>
-                      </a:r>
-                    </a:p>
-                  </a:txBody>
-                  <a:tcPr/>
-                </a:tc>
-                <a:tc>
-                  <a:txBody>
-                    <a:bodyPr/>
-                    <a:lstStyle/>
-                    <a:p>
-                      <a:pPr algn="ctr"/>
-                      <a:r>
-                        <a:rPr lang="en-US" sz="3200" dirty="0"/>
-                        <a:t>76</a:t>
-                      </a:r>
-                    </a:p>
-                  </a:txBody>
-                  <a:tcPr/>
-                </a:tc>
-                <a:tc>
-                  <a:txBody>
-                    <a:bodyPr/>
-                    <a:lstStyle/>
-                    <a:p>
-                      <a:pPr algn="ctr"/>
-                      <a:r>
-                        <a:rPr lang="en-US" sz="3200" dirty="0"/>
-                        <a:t>78.6</a:t>
-                      </a:r>
-                    </a:p>
-                  </a:txBody>
-                  <a:tcPr/>
-                </a:tc>
-                <a:extLst>
-                  <a:ext uri="{0D108BD9-81ED-4DB2-BD59-A6C34878D82A}">
-                    <a16:rowId xmlns:a16="http://schemas.microsoft.com/office/drawing/2014/main" val="3739012202"/>
-                  </a:ext>
-                </a:extLst>
-              </a:tr>
-              <a:tr h="933450">
-                <a:tc>
-                  <a:txBody>
-                    <a:bodyPr/>
-                    <a:lstStyle/>
-                    <a:p>
-                      <a:pPr algn="ctr"/>
-                      <a:r>
-                        <a:rPr lang="en-US" sz="3200" dirty="0"/>
-                        <a:t>100</a:t>
-                      </a:r>
-                    </a:p>
-                  </a:txBody>
-                  <a:tcPr/>
-                </a:tc>
-                <a:tc>
-                  <a:txBody>
-                    <a:bodyPr/>
-                    <a:lstStyle/>
-                    <a:p>
-                      <a:pPr algn="ctr"/>
-                      <a:r>
-                        <a:rPr lang="en-US" sz="3200" dirty="0"/>
-                        <a:t>74.4</a:t>
-                      </a:r>
-                    </a:p>
-                  </a:txBody>
-                  <a:tcPr/>
-                </a:tc>
-                <a:tc>
-                  <a:txBody>
-                    <a:bodyPr/>
-                    <a:lstStyle/>
-                    <a:p>
-                      <a:pPr algn="ctr"/>
-                      <a:r>
-                        <a:rPr lang="en-US" sz="3200" dirty="0"/>
-                        <a:t>79.3</a:t>
-                      </a:r>
-                    </a:p>
-                  </a:txBody>
-                  <a:tcPr/>
-                </a:tc>
-                <a:extLst>
-                  <a:ext uri="{0D108BD9-81ED-4DB2-BD59-A6C34878D82A}">
-                    <a16:rowId xmlns:a16="http://schemas.microsoft.com/office/drawing/2014/main" val="3886935003"/>
-                  </a:ext>
-                </a:extLst>
-              </a:tr>
-            </a:tbl>
-          </a:graphicData>
-        </a:graphic>
-      </p:graphicFrame>
+          </p:nvPr>
+        </p:nvSpPr>
+        <p:spPr/>
+        <p:txBody>
+          <a:bodyPr/>
+          <a:lstStyle/>
+          <a:p>
+            <a:r>
+              <a:rPr lang="en-US" dirty="0"/>
+              <a:t>Typical application circuit is simpler than the alternatives</a:t>
+            </a:r>
+          </a:p>
+          <a:p>
+            <a:endParaRPr lang="en-US" dirty="0"/>
+          </a:p>
+        </p:txBody>
+      </p:sp>
+      <p:pic>
+        <p:nvPicPr>
+          <p:cNvPr id="1030" name="Picture 6">
+            <a:extLst>
+              <a:ext uri="{FF2B5EF4-FFF2-40B4-BE49-F238E27FC236}">
+                <a16:creationId xmlns:a16="http://schemas.microsoft.com/office/drawing/2014/main" id="{2D41E47B-BA66-482E-95E7-A3B052C60DC3}"/>
+              </a:ext>
+            </a:extLst>
+          </p:cNvPr>
+          <p:cNvPicPr>
+            <a:picLocks noChangeAspect="1" noChangeArrowheads="1"/>
+          </p:cNvPicPr>
+          <p:nvPr/>
+        </p:nvPicPr>
+        <p:blipFill>
+          <a:blip r:embed="rId2">
+            <a:extLst>
+              <a:ext uri="{28A0092B-C50C-407E-A947-70E740481C1C}">
+                <a14:useLocalDpi xmlns:a14="http://schemas.microsoft.com/office/drawing/2010/main" val="0"/>
+              </a:ext>
+            </a:extLst>
+          </a:blip>
+          <a:srcRect/>
+          <a:stretch>
+            <a:fillRect/>
+          </a:stretch>
+        </p:blipFill>
+        <p:spPr bwMode="auto">
+          <a:xfrm>
+            <a:off x="1362075" y="2350690"/>
+            <a:ext cx="9467850" cy="4142185"/>
+          </a:xfrm>
+          <a:prstGeom prst="rect">
+            <a:avLst/>
+          </a:prstGeom>
+          <a:noFill/>
+          <a:extLst>
+            <a:ext uri="{909E8E84-426E-40DD-AFC4-6F175D3DCCD1}">
+              <a14:hiddenFill xmlns:a14="http://schemas.microsoft.com/office/drawing/2010/main">
+                <a:solidFill>
+                  <a:srgbClr val="FFFFFF"/>
+                </a:solidFill>
+              </a14:hiddenFill>
+            </a:ext>
+          </a:extLst>
+        </p:spPr>
+      </p:pic>
     </p:spTree>
     <p:extLst>
       <p:ext uri="{BB962C8B-B14F-4D97-AF65-F5344CB8AC3E}">
-        <p14:creationId xmlns:p14="http://schemas.microsoft.com/office/powerpoint/2010/main" val="1242899207"/>
+        <p14:creationId xmlns:p14="http://schemas.microsoft.com/office/powerpoint/2010/main" val="1771604426"/>
       </p:ext>
     </p:extLst>
   </p:cSld>
@@ -3811,6 +3593,287 @@
 </file>
 
 <file path=ppt/slides/slide11.xml><?xml version="1.0" encoding="utf-8"?>
+<p:sld xmlns:a="http://schemas.openxmlformats.org/drawingml/2006/main" xmlns:r="http://schemas.openxmlformats.org/officeDocument/2006/relationships" xmlns:p="http://schemas.openxmlformats.org/presentationml/2006/main">
+  <p:cSld>
+    <p:spTree>
+      <p:nvGrpSpPr>
+        <p:cNvPr id="1" name=""/>
+        <p:cNvGrpSpPr/>
+        <p:nvPr/>
+      </p:nvGrpSpPr>
+      <p:grpSpPr>
+        <a:xfrm>
+          <a:off x="0" y="0"/>
+          <a:ext cx="0" cy="0"/>
+          <a:chOff x="0" y="0"/>
+          <a:chExt cx="0" cy="0"/>
+        </a:xfrm>
+      </p:grpSpPr>
+      <p:sp>
+        <p:nvSpPr>
+          <p:cNvPr id="2" name="Başlık 1">
+            <a:extLst>
+              <a:ext uri="{FF2B5EF4-FFF2-40B4-BE49-F238E27FC236}">
+                <a16:creationId xmlns:a16="http://schemas.microsoft.com/office/drawing/2014/main" id="{22F945F7-733E-1F66-7409-0A42D7D46C2F}"/>
+              </a:ext>
+            </a:extLst>
+          </p:cNvPr>
+          <p:cNvSpPr>
+            <a:spLocks noGrp="1"/>
+          </p:cNvSpPr>
+          <p:nvPr>
+            <p:ph type="title"/>
+          </p:nvPr>
+        </p:nvSpPr>
+        <p:spPr/>
+        <p:txBody>
+          <a:bodyPr/>
+          <a:lstStyle/>
+          <a:p>
+            <a:r>
+              <a:rPr lang="tr-TR" dirty="0" err="1"/>
+              <a:t>Targeted</a:t>
+            </a:r>
+            <a:r>
+              <a:rPr lang="tr-TR" dirty="0"/>
+              <a:t> </a:t>
+            </a:r>
+            <a:r>
+              <a:rPr lang="tr-TR" dirty="0" err="1"/>
+              <a:t>Bonuses</a:t>
+            </a:r>
+            <a:endParaRPr lang="en-US" dirty="0"/>
+          </a:p>
+        </p:txBody>
+      </p:sp>
+      <p:sp>
+        <p:nvSpPr>
+          <p:cNvPr id="3" name="İçerik Yer Tutucusu 2">
+            <a:extLst>
+              <a:ext uri="{FF2B5EF4-FFF2-40B4-BE49-F238E27FC236}">
+                <a16:creationId xmlns:a16="http://schemas.microsoft.com/office/drawing/2014/main" id="{735836B8-A696-2C1E-2741-8C8A762CAB56}"/>
+              </a:ext>
+            </a:extLst>
+          </p:cNvPr>
+          <p:cNvSpPr>
+            <a:spLocks noGrp="1"/>
+          </p:cNvSpPr>
+          <p:nvPr>
+            <p:ph idx="1"/>
+          </p:nvPr>
+        </p:nvSpPr>
+        <p:spPr/>
+        <p:txBody>
+          <a:bodyPr/>
+          <a:lstStyle/>
+          <a:p>
+            <a:r>
+              <a:rPr lang="tr-TR" dirty="0"/>
+              <a:t>Analog </a:t>
+            </a:r>
+            <a:r>
+              <a:rPr lang="tr-TR" dirty="0" err="1"/>
+              <a:t>controller</a:t>
+            </a:r>
+            <a:endParaRPr lang="tr-TR" dirty="0"/>
+          </a:p>
+          <a:p>
+            <a:r>
+              <a:rPr lang="tr-TR" dirty="0" err="1"/>
+              <a:t>Current-mode</a:t>
+            </a:r>
+            <a:r>
+              <a:rPr lang="tr-TR" dirty="0"/>
+              <a:t> </a:t>
+            </a:r>
+            <a:r>
+              <a:rPr lang="tr-TR" dirty="0" err="1"/>
+              <a:t>control</a:t>
+            </a:r>
+            <a:endParaRPr lang="tr-TR" dirty="0"/>
+          </a:p>
+          <a:p>
+            <a:r>
+              <a:rPr lang="tr-TR" dirty="0"/>
+              <a:t>PCB</a:t>
+            </a:r>
+          </a:p>
+          <a:p>
+            <a:r>
+              <a:rPr lang="tr-TR" dirty="0" err="1"/>
+              <a:t>Industrial</a:t>
+            </a:r>
+            <a:r>
+              <a:rPr lang="tr-TR" dirty="0"/>
+              <a:t> </a:t>
+            </a:r>
+            <a:r>
+              <a:rPr lang="tr-TR" dirty="0" err="1"/>
+              <a:t>design</a:t>
+            </a:r>
+            <a:endParaRPr lang="tr-TR" dirty="0"/>
+          </a:p>
+          <a:p>
+            <a:r>
+              <a:rPr lang="tr-TR" dirty="0" err="1"/>
+              <a:t>Negative</a:t>
+            </a:r>
+            <a:r>
+              <a:rPr lang="tr-TR" dirty="0"/>
+              <a:t> </a:t>
+            </a:r>
+            <a:r>
+              <a:rPr lang="tr-TR" dirty="0" err="1"/>
+              <a:t>efficiency</a:t>
+            </a:r>
+            <a:r>
+              <a:rPr lang="tr-TR" dirty="0"/>
+              <a:t> bonus (</a:t>
+            </a:r>
+            <a:r>
+              <a:rPr lang="tr-TR" dirty="0" err="1"/>
+              <a:t>joke</a:t>
+            </a:r>
+            <a:r>
+              <a:rPr lang="tr-TR" dirty="0"/>
+              <a:t>)</a:t>
+            </a:r>
+            <a:endParaRPr lang="en-US" dirty="0"/>
+          </a:p>
+        </p:txBody>
+      </p:sp>
+    </p:spTree>
+    <p:extLst>
+      <p:ext uri="{BB962C8B-B14F-4D97-AF65-F5344CB8AC3E}">
+        <p14:creationId xmlns:p14="http://schemas.microsoft.com/office/powerpoint/2010/main" val="2666647867"/>
+      </p:ext>
+    </p:extLst>
+  </p:cSld>
+  <p:clrMapOvr>
+    <a:masterClrMapping/>
+  </p:clrMapOvr>
+</p:sld>
+</file>
+
+<file path=ppt/slides/slide12.xml><?xml version="1.0" encoding="utf-8"?>
+<p:sld xmlns:a="http://schemas.openxmlformats.org/drawingml/2006/main" xmlns:r="http://schemas.openxmlformats.org/officeDocument/2006/relationships" xmlns:p="http://schemas.openxmlformats.org/presentationml/2006/main">
+  <p:cSld>
+    <p:spTree>
+      <p:nvGrpSpPr>
+        <p:cNvPr id="1" name=""/>
+        <p:cNvGrpSpPr/>
+        <p:nvPr/>
+      </p:nvGrpSpPr>
+      <p:grpSpPr>
+        <a:xfrm>
+          <a:off x="0" y="0"/>
+          <a:ext cx="0" cy="0"/>
+          <a:chOff x="0" y="0"/>
+          <a:chExt cx="0" cy="0"/>
+        </a:xfrm>
+      </p:grpSpPr>
+      <p:sp>
+        <p:nvSpPr>
+          <p:cNvPr id="2" name="Başlık 1">
+            <a:extLst>
+              <a:ext uri="{FF2B5EF4-FFF2-40B4-BE49-F238E27FC236}">
+                <a16:creationId xmlns:a16="http://schemas.microsoft.com/office/drawing/2014/main" id="{77C96FB8-9DBF-8B6B-91F1-CC33D3E927FD}"/>
+              </a:ext>
+            </a:extLst>
+          </p:cNvPr>
+          <p:cNvSpPr>
+            <a:spLocks noGrp="1"/>
+          </p:cNvSpPr>
+          <p:nvPr>
+            <p:ph type="title"/>
+          </p:nvPr>
+        </p:nvSpPr>
+        <p:spPr/>
+        <p:txBody>
+          <a:bodyPr/>
+          <a:lstStyle/>
+          <a:p>
+            <a:r>
+              <a:rPr lang="tr-TR" dirty="0"/>
+              <a:t>DCM limit </a:t>
+            </a:r>
+            <a:r>
+              <a:rPr lang="tr-TR" dirty="0" err="1"/>
+              <a:t>graph</a:t>
+            </a:r>
+            <a:r>
+              <a:rPr lang="tr-TR" dirty="0"/>
+              <a:t> </a:t>
+            </a:r>
+            <a:r>
+              <a:rPr lang="tr-TR" dirty="0" err="1"/>
+              <a:t>for</a:t>
+            </a:r>
+            <a:r>
+              <a:rPr lang="tr-TR" dirty="0"/>
+              <a:t> </a:t>
+            </a:r>
+            <a:r>
+              <a:rPr lang="tr-TR" dirty="0" err="1"/>
+              <a:t>Vin</a:t>
+            </a:r>
+            <a:r>
+              <a:rPr lang="tr-TR" dirty="0"/>
+              <a:t> = 18V</a:t>
+            </a:r>
+            <a:endParaRPr lang="en-US" dirty="0"/>
+          </a:p>
+        </p:txBody>
+      </p:sp>
+      <p:pic>
+        <p:nvPicPr>
+          <p:cNvPr id="5" name="İçerik Yer Tutucusu 4" descr="metin, çizgi, öykü gelişim çizgisi; kumpas; grafiğini çıkarma, diyagram içeren bir resim&#10;&#10;Açıklama otomatik olarak oluşturuldu">
+            <a:extLst>
+              <a:ext uri="{FF2B5EF4-FFF2-40B4-BE49-F238E27FC236}">
+                <a16:creationId xmlns:a16="http://schemas.microsoft.com/office/drawing/2014/main" id="{6ACD5A18-46BA-67CA-9A9E-25B8676501E8}"/>
+              </a:ext>
+            </a:extLst>
+          </p:cNvPr>
+          <p:cNvPicPr>
+            <a:picLocks noGrp="1" noChangeAspect="1"/>
+          </p:cNvPicPr>
+          <p:nvPr>
+            <p:ph idx="1"/>
+          </p:nvPr>
+        </p:nvPicPr>
+        <p:blipFill>
+          <a:blip r:embed="rId2">
+            <a:extLst>
+              <a:ext uri="{28A0092B-C50C-407E-A947-70E740481C1C}">
+                <a14:useLocalDpi xmlns:a14="http://schemas.microsoft.com/office/drawing/2010/main" val="0"/>
+              </a:ext>
+            </a:extLst>
+          </a:blip>
+          <a:stretch>
+            <a:fillRect/>
+          </a:stretch>
+        </p:blipFill>
+        <p:spPr>
+          <a:xfrm>
+            <a:off x="4040117" y="1786919"/>
+            <a:ext cx="4373022" cy="4351338"/>
+          </a:xfrm>
+        </p:spPr>
+      </p:pic>
+    </p:spTree>
+    <p:extLst>
+      <p:ext uri="{BB962C8B-B14F-4D97-AF65-F5344CB8AC3E}">
+        <p14:creationId xmlns:p14="http://schemas.microsoft.com/office/powerpoint/2010/main" val="1290005445"/>
+      </p:ext>
+    </p:extLst>
+  </p:cSld>
+  <p:clrMapOvr>
+    <a:masterClrMapping/>
+  </p:clrMapOvr>
+</p:sld>
+</file>
+
+<file path=ppt/slides/slide13.xml><?xml version="1.0" encoding="utf-8"?>
 <p:sld xmlns:a="http://schemas.openxmlformats.org/drawingml/2006/main" xmlns:r="http://schemas.openxmlformats.org/officeDocument/2006/relationships" xmlns:p="http://schemas.openxmlformats.org/presentationml/2006/main">
   <p:cSld>
     <p:spTree>
@@ -5369,6 +5432,17 @@
                   </a:rPr>
                   <a:t> = 1.42</a:t>
                 </a:r>
+                <a:r>
+                  <a:rPr lang="tr-TR" sz="3200" dirty="0">
+                    <a:latin typeface="Calibri" panose="020F0502020204030204" pitchFamily="34" charset="0"/>
+                    <a:ea typeface="Calibri" panose="020F0502020204030204" pitchFamily="34" charset="0"/>
+                  </a:rPr>
+                  <a:t>W</a:t>
+                </a:r>
+                <a:endParaRPr lang="en-US" sz="3200" dirty="0">
+                  <a:latin typeface="Calibri" panose="020F0502020204030204" pitchFamily="34" charset="0"/>
+                  <a:ea typeface="Calibri" panose="020F0502020204030204" pitchFamily="34" charset="0"/>
+                </a:endParaRPr>
               </a:p>
               <a:p>
                 <a:pPr marL="0" marR="0" algn="just">
@@ -5391,7 +5465,7 @@
                 </a:r>
               </a:p>
               <a:p>
-                <a:pPr marL="0" marR="0" algn="just">
+                <a:pPr marL="0" marR="0" indent="0" algn="just">
                   <a:lnSpc>
                     <a:spcPct val="107000"/>
                   </a:lnSpc>
@@ -5401,24 +5475,7 @@
                   <a:spcAft>
                     <a:spcPts val="800"/>
                   </a:spcAft>
-                </a:pPr>
-                <a:endParaRPr lang="en-US" sz="3200" dirty="0">
-                  <a:effectLst/>
-                  <a:latin typeface="Calibri" panose="020F0502020204030204" pitchFamily="34" charset="0"/>
-                  <a:ea typeface="Calibri" panose="020F0502020204030204" pitchFamily="34" charset="0"/>
-                </a:endParaRPr>
-              </a:p>
-              <a:p>
-                <a:pPr marL="0" marR="0" algn="just">
-                  <a:lnSpc>
-                    <a:spcPct val="107000"/>
-                  </a:lnSpc>
-                  <a:spcBef>
-                    <a:spcPts val="0"/>
-                  </a:spcBef>
-                  <a:spcAft>
-                    <a:spcPts val="800"/>
-                  </a:spcAft>
+                  <a:buNone/>
                 </a:pPr>
                 <a:endParaRPr lang="en-US" sz="3200" dirty="0">
                   <a:effectLst/>
@@ -5563,8 +5620,8 @@
           </a:p>
         </p:txBody>
       </p:sp>
-      <mc:AlternateContent xmlns:mc="http://schemas.openxmlformats.org/markup-compatibility/2006">
-        <mc:Choice xmlns:a14="http://schemas.microsoft.com/office/drawing/2010/main" Requires="a14">
+      <mc:AlternateContent xmlns:mc="http://schemas.openxmlformats.org/markup-compatibility/2006" xmlns:a14="http://schemas.microsoft.com/office/drawing/2010/main">
+        <mc:Choice Requires="a14">
           <p:sp>
             <p:nvSpPr>
               <p:cNvPr id="3" name="Content Placeholder 2">
@@ -5707,7 +5764,7 @@
             </p:txBody>
           </p:sp>
         </mc:Choice>
-        <mc:Fallback>
+        <mc:Fallback xmlns="">
           <p:sp>
             <p:nvSpPr>
               <p:cNvPr id="3" name="Content Placeholder 2">
@@ -6390,7 +6447,7 @@
           <p:cNvPr id="2" name="Title 1">
             <a:extLst>
               <a:ext uri="{FF2B5EF4-FFF2-40B4-BE49-F238E27FC236}">
-                <a16:creationId xmlns:a16="http://schemas.microsoft.com/office/drawing/2014/main" id="{C670D02B-CE3A-4A0B-A13F-D9569E334D4E}"/>
+                <a16:creationId xmlns:a16="http://schemas.microsoft.com/office/drawing/2014/main" id="{DD52401F-2C7B-4276-AB25-B19D8D439BA7}"/>
               </a:ext>
             </a:extLst>
           </p:cNvPr>
@@ -6408,93 +6465,318 @@
           <a:p>
             <a:r>
               <a:rPr lang="en-US" dirty="0"/>
-              <a:t>Controller: UC3843</a:t>
-            </a:r>
-          </a:p>
-        </p:txBody>
-      </p:sp>
-      <p:sp>
-        <p:nvSpPr>
-          <p:cNvPr id="3" name="Content Placeholder 2">
-            <a:extLst>
-              <a:ext uri="{FF2B5EF4-FFF2-40B4-BE49-F238E27FC236}">
-                <a16:creationId xmlns:a16="http://schemas.microsoft.com/office/drawing/2014/main" id="{2C58BCCF-C7C5-4BEB-9A03-4D0529186014}"/>
-              </a:ext>
-            </a:extLst>
-          </p:cNvPr>
-          <p:cNvSpPr>
-            <a:spLocks noGrp="1"/>
-          </p:cNvSpPr>
+              <a:t>Efficiency Calculations</a:t>
+            </a:r>
+          </a:p>
+        </p:txBody>
+      </p:sp>
+      <p:graphicFrame>
+        <p:nvGraphicFramePr>
+          <p:cNvPr id="6" name="Table 6">
+            <a:extLst>
+              <a:ext uri="{FF2B5EF4-FFF2-40B4-BE49-F238E27FC236}">
+                <a16:creationId xmlns:a16="http://schemas.microsoft.com/office/drawing/2014/main" id="{A6381643-80EA-4B0F-8C4E-CFF329046A5B}"/>
+              </a:ext>
+            </a:extLst>
+          </p:cNvPr>
+          <p:cNvGraphicFramePr>
+            <a:graphicFrameLocks noGrp="1"/>
+          </p:cNvGraphicFramePr>
           <p:nvPr>
             <p:ph idx="1"/>
-          </p:nvPr>
-        </p:nvSpPr>
-        <p:spPr/>
-        <p:txBody>
-          <a:bodyPr/>
-          <a:lstStyle/>
-          <a:p>
-            <a:r>
-              <a:rPr lang="en-US" dirty="0"/>
-              <a:t>Typical application circuit is simpler than the alternatives</a:t>
-            </a:r>
-          </a:p>
-          <a:p>
-            <a:endParaRPr lang="en-US" dirty="0"/>
-          </a:p>
-        </p:txBody>
-      </p:sp>
-      <p:pic>
-        <p:nvPicPr>
-          <p:cNvPr id="1030" name="Picture 6">
-            <a:extLst>
-              <a:ext uri="{FF2B5EF4-FFF2-40B4-BE49-F238E27FC236}">
-                <a16:creationId xmlns:a16="http://schemas.microsoft.com/office/drawing/2014/main" id="{2D41E47B-BA66-482E-95E7-A3B052C60DC3}"/>
-              </a:ext>
-            </a:extLst>
-          </p:cNvPr>
-          <p:cNvPicPr>
-            <a:picLocks noChangeAspect="1" noChangeArrowheads="1"/>
-          </p:cNvPicPr>
-          <p:nvPr/>
-        </p:nvPicPr>
-        <p:blipFill>
-          <a:blip r:embed="rId2">
-            <a:extLst>
-              <a:ext uri="{28A0092B-C50C-407E-A947-70E740481C1C}">
-                <a14:useLocalDpi xmlns:a14="http://schemas.microsoft.com/office/drawing/2010/main" val="0"/>
-              </a:ext>
-            </a:extLst>
-          </a:blip>
-          <a:srcRect/>
-          <a:stretch>
-            <a:fillRect/>
-          </a:stretch>
-        </p:blipFill>
-        <p:spPr bwMode="auto">
-          <a:xfrm>
-            <a:off x="1362075" y="2350690"/>
-            <a:ext cx="9467850" cy="4142185"/>
-          </a:xfrm>
-          <a:prstGeom prst="rect">
-            <a:avLst/>
-          </a:prstGeom>
-          <a:noFill/>
-          <a:extLst>
-            <a:ext uri="{909E8E84-426E-40DD-AFC4-6F175D3DCCD1}">
-              <a14:hiddenFill xmlns:a14="http://schemas.microsoft.com/office/drawing/2010/main">
-                <a:solidFill>
-                  <a:srgbClr val="FFFFFF"/>
-                </a:solidFill>
-              </a14:hiddenFill>
-            </a:ext>
-          </a:extLst>
-        </p:spPr>
-      </p:pic>
+            <p:extLst>
+              <p:ext uri="{D42A27DB-BD31-4B8C-83A1-F6EECF244321}">
+                <p14:modId xmlns:p14="http://schemas.microsoft.com/office/powerpoint/2010/main" val="2198122635"/>
+              </p:ext>
+            </p:extLst>
+          </p:nvPr>
+        </p:nvGraphicFramePr>
+        <p:xfrm>
+          <a:off x="838200" y="1825625"/>
+          <a:ext cx="10515600" cy="4667250"/>
+        </p:xfrm>
+        <a:graphic>
+          <a:graphicData uri="http://schemas.openxmlformats.org/drawingml/2006/table">
+            <a:tbl>
+              <a:tblPr firstRow="1" bandRow="1">
+                <a:tableStyleId>{5C22544A-7EE6-4342-B048-85BDC9FD1C3A}</a:tableStyleId>
+              </a:tblPr>
+              <a:tblGrid>
+                <a:gridCol w="3505200">
+                  <a:extLst>
+                    <a:ext uri="{9D8B030D-6E8A-4147-A177-3AD203B41FA5}">
+                      <a16:colId xmlns:a16="http://schemas.microsoft.com/office/drawing/2014/main" val="2456820567"/>
+                    </a:ext>
+                  </a:extLst>
+                </a:gridCol>
+                <a:gridCol w="3505200">
+                  <a:extLst>
+                    <a:ext uri="{9D8B030D-6E8A-4147-A177-3AD203B41FA5}">
+                      <a16:colId xmlns:a16="http://schemas.microsoft.com/office/drawing/2014/main" val="1682064277"/>
+                    </a:ext>
+                  </a:extLst>
+                </a:gridCol>
+                <a:gridCol w="3505200">
+                  <a:extLst>
+                    <a:ext uri="{9D8B030D-6E8A-4147-A177-3AD203B41FA5}">
+                      <a16:colId xmlns:a16="http://schemas.microsoft.com/office/drawing/2014/main" val="114378116"/>
+                    </a:ext>
+                  </a:extLst>
+                </a:gridCol>
+              </a:tblGrid>
+              <a:tr h="933450">
+                <a:tc>
+                  <a:txBody>
+                    <a:bodyPr/>
+                    <a:lstStyle/>
+                    <a:p>
+                      <a:pPr algn="ctr"/>
+                      <a:r>
+                        <a:rPr lang="en-US" sz="3200" dirty="0"/>
+                        <a:t>Load (%)</a:t>
+                      </a:r>
+                    </a:p>
+                  </a:txBody>
+                  <a:tcPr/>
+                </a:tc>
+                <a:tc>
+                  <a:txBody>
+                    <a:bodyPr/>
+                    <a:lstStyle/>
+                    <a:p>
+                      <a:pPr algn="ctr"/>
+                      <a:r>
+                        <a:rPr lang="en-US" sz="3200" dirty="0"/>
+                        <a:t>Vin = 12V</a:t>
+                      </a:r>
+                    </a:p>
+                  </a:txBody>
+                  <a:tcPr/>
+                </a:tc>
+                <a:tc>
+                  <a:txBody>
+                    <a:bodyPr/>
+                    <a:lstStyle/>
+                    <a:p>
+                      <a:pPr algn="ctr"/>
+                      <a:r>
+                        <a:rPr lang="en-US" sz="3200" dirty="0"/>
+                        <a:t>Vin = 18V</a:t>
+                      </a:r>
+                    </a:p>
+                  </a:txBody>
+                  <a:tcPr/>
+                </a:tc>
+                <a:extLst>
+                  <a:ext uri="{0D108BD9-81ED-4DB2-BD59-A6C34878D82A}">
+                    <a16:rowId xmlns:a16="http://schemas.microsoft.com/office/drawing/2014/main" val="1792460050"/>
+                  </a:ext>
+                </a:extLst>
+              </a:tr>
+              <a:tr h="933450">
+                <a:tc>
+                  <a:txBody>
+                    <a:bodyPr/>
+                    <a:lstStyle/>
+                    <a:p>
+                      <a:pPr algn="ctr"/>
+                      <a:r>
+                        <a:rPr lang="en-US" sz="3200" dirty="0"/>
+                        <a:t>25</a:t>
+                      </a:r>
+                    </a:p>
+                  </a:txBody>
+                  <a:tcPr/>
+                </a:tc>
+                <a:tc>
+                  <a:txBody>
+                    <a:bodyPr/>
+                    <a:lstStyle/>
+                    <a:p>
+                      <a:pPr algn="ctr"/>
+                      <a:r>
+                        <a:rPr lang="en-US" sz="3200" dirty="0"/>
+                        <a:t>72.2</a:t>
+                      </a:r>
+                    </a:p>
+                  </a:txBody>
+                  <a:tcPr/>
+                </a:tc>
+                <a:tc>
+                  <a:txBody>
+                    <a:bodyPr/>
+                    <a:lstStyle/>
+                    <a:p>
+                      <a:pPr algn="ctr"/>
+                      <a:r>
+                        <a:rPr lang="en-US" sz="3200" dirty="0"/>
+                        <a:t>65.9</a:t>
+                      </a:r>
+                    </a:p>
+                  </a:txBody>
+                  <a:tcPr/>
+                </a:tc>
+                <a:extLst>
+                  <a:ext uri="{0D108BD9-81ED-4DB2-BD59-A6C34878D82A}">
+                    <a16:rowId xmlns:a16="http://schemas.microsoft.com/office/drawing/2014/main" val="2253898298"/>
+                  </a:ext>
+                </a:extLst>
+              </a:tr>
+              <a:tr h="933450">
+                <a:tc>
+                  <a:txBody>
+                    <a:bodyPr/>
+                    <a:lstStyle/>
+                    <a:p>
+                      <a:pPr algn="ctr"/>
+                      <a:r>
+                        <a:rPr lang="en-US" sz="3200" dirty="0"/>
+                        <a:t>50</a:t>
+                      </a:r>
+                    </a:p>
+                  </a:txBody>
+                  <a:tcPr/>
+                </a:tc>
+                <a:tc>
+                  <a:txBody>
+                    <a:bodyPr/>
+                    <a:lstStyle/>
+                    <a:p>
+                      <a:pPr algn="ctr"/>
+                      <a:r>
+                        <a:rPr lang="en-US" sz="3200" dirty="0"/>
+                        <a:t>77</a:t>
+                      </a:r>
+                    </a:p>
+                  </a:txBody>
+                  <a:tcPr/>
+                </a:tc>
+                <a:tc>
+                  <a:txBody>
+                    <a:bodyPr/>
+                    <a:lstStyle/>
+                    <a:p>
+                      <a:pPr algn="ctr"/>
+                      <a:r>
+                        <a:rPr lang="en-US" sz="3200" dirty="0"/>
+                        <a:t>76</a:t>
+                      </a:r>
+                    </a:p>
+                  </a:txBody>
+                  <a:tcPr/>
+                </a:tc>
+                <a:extLst>
+                  <a:ext uri="{0D108BD9-81ED-4DB2-BD59-A6C34878D82A}">
+                    <a16:rowId xmlns:a16="http://schemas.microsoft.com/office/drawing/2014/main" val="3708298407"/>
+                  </a:ext>
+                </a:extLst>
+              </a:tr>
+              <a:tr h="933450">
+                <a:tc>
+                  <a:txBody>
+                    <a:bodyPr/>
+                    <a:lstStyle/>
+                    <a:p>
+                      <a:pPr algn="ctr"/>
+                      <a:r>
+                        <a:rPr lang="en-US" sz="3200" dirty="0"/>
+                        <a:t>75</a:t>
+                      </a:r>
+                    </a:p>
+                  </a:txBody>
+                  <a:tcPr/>
+                </a:tc>
+                <a:tc>
+                  <a:txBody>
+                    <a:bodyPr/>
+                    <a:lstStyle/>
+                    <a:p>
+                      <a:pPr algn="ctr"/>
+                      <a:r>
+                        <a:rPr lang="en-US" sz="3200" dirty="0"/>
+                        <a:t>76</a:t>
+                      </a:r>
+                    </a:p>
+                  </a:txBody>
+                  <a:tcPr/>
+                </a:tc>
+                <a:tc>
+                  <a:txBody>
+                    <a:bodyPr/>
+                    <a:lstStyle/>
+                    <a:p>
+                      <a:pPr algn="ctr"/>
+                      <a:r>
+                        <a:rPr lang="en-US" sz="3200" dirty="0"/>
+                        <a:t>78.6</a:t>
+                      </a:r>
+                    </a:p>
+                  </a:txBody>
+                  <a:tcPr/>
+                </a:tc>
+                <a:extLst>
+                  <a:ext uri="{0D108BD9-81ED-4DB2-BD59-A6C34878D82A}">
+                    <a16:rowId xmlns:a16="http://schemas.microsoft.com/office/drawing/2014/main" val="3739012202"/>
+                  </a:ext>
+                </a:extLst>
+              </a:tr>
+              <a:tr h="933450">
+                <a:tc>
+                  <a:txBody>
+                    <a:bodyPr/>
+                    <a:lstStyle/>
+                    <a:p>
+                      <a:pPr algn="ctr"/>
+                      <a:r>
+                        <a:rPr lang="en-US" sz="3200" dirty="0"/>
+                        <a:t>100</a:t>
+                      </a:r>
+                    </a:p>
+                  </a:txBody>
+                  <a:tcPr/>
+                </a:tc>
+                <a:tc>
+                  <a:txBody>
+                    <a:bodyPr/>
+                    <a:lstStyle/>
+                    <a:p>
+                      <a:pPr algn="ctr"/>
+                      <a:r>
+                        <a:rPr lang="en-US" sz="3200" dirty="0"/>
+                        <a:t>74.4</a:t>
+                      </a:r>
+                    </a:p>
+                  </a:txBody>
+                  <a:tcPr/>
+                </a:tc>
+                <a:tc>
+                  <a:txBody>
+                    <a:bodyPr/>
+                    <a:lstStyle/>
+                    <a:p>
+                      <a:pPr algn="ctr"/>
+                      <a:r>
+                        <a:rPr lang="en-US" sz="3200" dirty="0"/>
+                        <a:t>79.3</a:t>
+                      </a:r>
+                    </a:p>
+                  </a:txBody>
+                  <a:tcPr/>
+                </a:tc>
+                <a:extLst>
+                  <a:ext uri="{0D108BD9-81ED-4DB2-BD59-A6C34878D82A}">
+                    <a16:rowId xmlns:a16="http://schemas.microsoft.com/office/drawing/2014/main" val="3886935003"/>
+                  </a:ext>
+                </a:extLst>
+              </a:tr>
+            </a:tbl>
+          </a:graphicData>
+        </a:graphic>
+      </p:graphicFrame>
     </p:spTree>
     <p:extLst>
       <p:ext uri="{BB962C8B-B14F-4D97-AF65-F5344CB8AC3E}">
-        <p14:creationId xmlns:p14="http://schemas.microsoft.com/office/powerpoint/2010/main" val="1771604426"/>
+        <p14:creationId xmlns:p14="http://schemas.microsoft.com/office/powerpoint/2010/main" val="1242899207"/>
       </p:ext>
     </p:extLst>
   </p:cSld>

</xml_diff>